<commit_message>
update CDSS continuum graphic
</commit_message>
<xml_diff>
--- a/graphics.pptx
+++ b/graphics.pptx
@@ -110,6 +110,11 @@
       </a:defRPr>
     </a:lvl9pPr>
   </p:defaultTextStyle>
+  <p:extLst>
+    <p:ext uri="{EFAFB233-063F-42B5-8137-9DF3F51BA10A}">
+      <p15:sldGuideLst xmlns:p15="http://schemas.microsoft.com/office/powerpoint/2012/main"/>
+    </p:ext>
+  </p:extLst>
 </p:presentation>
 </file>
 
@@ -195,7 +200,7 @@
           <a:p>
             <a:fld id="{DE2C9833-FA57-4813-8EED-51B9CE783BC8}" type="datetimeFigureOut">
               <a:rPr lang="en-AU" smtClean="0"/>
-              <a:t>18/08/2023</a:t>
+              <a:t>23/08/2023</a:t>
             </a:fld>
             <a:endParaRPr lang="en-AU"/>
           </a:p>
@@ -612,7 +617,7 @@
           <a:p>
             <a:fld id="{8B2D4AC2-C4E8-42C3-BDA3-4F9AA189E032}" type="datetimeFigureOut">
               <a:rPr lang="en-AU" smtClean="0"/>
-              <a:t>18/08/2023</a:t>
+              <a:t>23/08/2023</a:t>
             </a:fld>
             <a:endParaRPr lang="en-AU"/>
           </a:p>
@@ -812,7 +817,7 @@
           <a:p>
             <a:fld id="{8B2D4AC2-C4E8-42C3-BDA3-4F9AA189E032}" type="datetimeFigureOut">
               <a:rPr lang="en-AU" smtClean="0"/>
-              <a:t>18/08/2023</a:t>
+              <a:t>23/08/2023</a:t>
             </a:fld>
             <a:endParaRPr lang="en-AU"/>
           </a:p>
@@ -1022,7 +1027,7 @@
           <a:p>
             <a:fld id="{8B2D4AC2-C4E8-42C3-BDA3-4F9AA189E032}" type="datetimeFigureOut">
               <a:rPr lang="en-AU" smtClean="0"/>
-              <a:t>18/08/2023</a:t>
+              <a:t>23/08/2023</a:t>
             </a:fld>
             <a:endParaRPr lang="en-AU"/>
           </a:p>
@@ -1222,7 +1227,7 @@
           <a:p>
             <a:fld id="{8B2D4AC2-C4E8-42C3-BDA3-4F9AA189E032}" type="datetimeFigureOut">
               <a:rPr lang="en-AU" smtClean="0"/>
-              <a:t>18/08/2023</a:t>
+              <a:t>23/08/2023</a:t>
             </a:fld>
             <a:endParaRPr lang="en-AU"/>
           </a:p>
@@ -1498,7 +1503,7 @@
           <a:p>
             <a:fld id="{8B2D4AC2-C4E8-42C3-BDA3-4F9AA189E032}" type="datetimeFigureOut">
               <a:rPr lang="en-AU" smtClean="0"/>
-              <a:t>18/08/2023</a:t>
+              <a:t>23/08/2023</a:t>
             </a:fld>
             <a:endParaRPr lang="en-AU"/>
           </a:p>
@@ -1766,7 +1771,7 @@
           <a:p>
             <a:fld id="{8B2D4AC2-C4E8-42C3-BDA3-4F9AA189E032}" type="datetimeFigureOut">
               <a:rPr lang="en-AU" smtClean="0"/>
-              <a:t>18/08/2023</a:t>
+              <a:t>23/08/2023</a:t>
             </a:fld>
             <a:endParaRPr lang="en-AU"/>
           </a:p>
@@ -2181,7 +2186,7 @@
           <a:p>
             <a:fld id="{8B2D4AC2-C4E8-42C3-BDA3-4F9AA189E032}" type="datetimeFigureOut">
               <a:rPr lang="en-AU" smtClean="0"/>
-              <a:t>18/08/2023</a:t>
+              <a:t>23/08/2023</a:t>
             </a:fld>
             <a:endParaRPr lang="en-AU"/>
           </a:p>
@@ -2323,7 +2328,7 @@
           <a:p>
             <a:fld id="{8B2D4AC2-C4E8-42C3-BDA3-4F9AA189E032}" type="datetimeFigureOut">
               <a:rPr lang="en-AU" smtClean="0"/>
-              <a:t>18/08/2023</a:t>
+              <a:t>23/08/2023</a:t>
             </a:fld>
             <a:endParaRPr lang="en-AU"/>
           </a:p>
@@ -2436,7 +2441,7 @@
           <a:p>
             <a:fld id="{8B2D4AC2-C4E8-42C3-BDA3-4F9AA189E032}" type="datetimeFigureOut">
               <a:rPr lang="en-AU" smtClean="0"/>
-              <a:t>18/08/2023</a:t>
+              <a:t>23/08/2023</a:t>
             </a:fld>
             <a:endParaRPr lang="en-AU"/>
           </a:p>
@@ -2749,7 +2754,7 @@
           <a:p>
             <a:fld id="{8B2D4AC2-C4E8-42C3-BDA3-4F9AA189E032}" type="datetimeFigureOut">
               <a:rPr lang="en-AU" smtClean="0"/>
-              <a:t>18/08/2023</a:t>
+              <a:t>23/08/2023</a:t>
             </a:fld>
             <a:endParaRPr lang="en-AU"/>
           </a:p>
@@ -3038,7 +3043,7 @@
           <a:p>
             <a:fld id="{8B2D4AC2-C4E8-42C3-BDA3-4F9AA189E032}" type="datetimeFigureOut">
               <a:rPr lang="en-AU" smtClean="0"/>
-              <a:t>18/08/2023</a:t>
+              <a:t>23/08/2023</a:t>
             </a:fld>
             <a:endParaRPr lang="en-AU"/>
           </a:p>
@@ -3281,7 +3286,7 @@
           <a:p>
             <a:fld id="{8B2D4AC2-C4E8-42C3-BDA3-4F9AA189E032}" type="datetimeFigureOut">
               <a:rPr lang="en-AU" smtClean="0"/>
-              <a:t>18/08/2023</a:t>
+              <a:t>23/08/2023</a:t>
             </a:fld>
             <a:endParaRPr lang="en-AU"/>
           </a:p>
@@ -4362,9 +4367,9 @@
         <p:grpSpPr>
           <a:xfrm>
             <a:off x="749558" y="2988904"/>
-            <a:ext cx="10644115" cy="2770056"/>
+            <a:ext cx="10644115" cy="2383191"/>
             <a:chOff x="749558" y="2988904"/>
-            <a:chExt cx="10024189" cy="2770056"/>
+            <a:chExt cx="10024189" cy="2383191"/>
           </a:xfrm>
         </p:grpSpPr>
         <p:sp>
@@ -4730,7 +4735,7 @@
           <p:spPr>
             <a:xfrm>
               <a:off x="8599713" y="4069940"/>
-              <a:ext cx="2174034" cy="1689020"/>
+              <a:ext cx="2174034" cy="1302153"/>
             </a:xfrm>
             <a:prstGeom prst="roundRect">
               <a:avLst/>
@@ -4849,28 +4854,6 @@
                 <a:t>Outcome is common</a:t>
               </a:r>
             </a:p>
-            <a:p>
-              <a:pPr marL="285750" indent="-285750">
-                <a:buFontTx/>
-                <a:buChar char="-"/>
-              </a:pPr>
-              <a:r>
-                <a:rPr lang="en-AU" sz="1400" dirty="0">
-                  <a:ln w="0"/>
-                  <a:solidFill>
-                    <a:schemeClr val="tx1"/>
-                  </a:solidFill>
-                  <a:effectLst>
-                    <a:outerShdw blurRad="38100" dist="19050" dir="2700000" algn="tl" rotWithShape="0">
-                      <a:schemeClr val="dk1">
-                        <a:alpha val="40000"/>
-                      </a:schemeClr>
-                    </a:outerShdw>
-                  </a:effectLst>
-                </a:rPr>
-                <a:t>Is cheap and effective relative to outcome being prevented</a:t>
-              </a:r>
-            </a:p>
           </p:txBody>
         </p:sp>
       </p:grpSp>
@@ -4919,9 +4902,9 @@
         <p:grpSpPr>
           <a:xfrm>
             <a:off x="749558" y="2988904"/>
-            <a:ext cx="10644115" cy="2770056"/>
+            <a:ext cx="10644115" cy="2383191"/>
             <a:chOff x="749558" y="2988904"/>
-            <a:chExt cx="10024189" cy="2770056"/>
+            <a:chExt cx="10024189" cy="2383191"/>
           </a:xfrm>
         </p:grpSpPr>
         <p:sp>
@@ -5408,165 +5391,143 @@
             </a:p>
           </p:txBody>
         </p:sp>
-        <p:sp>
-          <p:nvSpPr>
-            <p:cNvPr id="5" name="Rectangle: Rounded Corners 4">
-              <a:extLst>
-                <a:ext uri="{FF2B5EF4-FFF2-40B4-BE49-F238E27FC236}">
-                  <a16:creationId xmlns:a16="http://schemas.microsoft.com/office/drawing/2014/main" id="{0CCA9567-AA29-3818-0706-B2FA3AF60641}"/>
-                </a:ext>
-              </a:extLst>
-            </p:cNvPr>
-            <p:cNvSpPr/>
-            <p:nvPr/>
-          </p:nvSpPr>
-          <p:spPr>
-            <a:xfrm>
-              <a:off x="8599713" y="4069940"/>
-              <a:ext cx="2174034" cy="1689020"/>
-            </a:xfrm>
-            <a:prstGeom prst="roundRect">
-              <a:avLst/>
-            </a:prstGeom>
-            <a:solidFill>
-              <a:schemeClr val="accent2">
-                <a:lumMod val="40000"/>
-                <a:lumOff val="60000"/>
-              </a:schemeClr>
-            </a:solidFill>
-          </p:spPr>
-          <p:style>
-            <a:lnRef idx="2">
-              <a:schemeClr val="accent1">
-                <a:shade val="15000"/>
-              </a:schemeClr>
-            </a:lnRef>
-            <a:fillRef idx="1">
-              <a:schemeClr val="accent1"/>
-            </a:fillRef>
-            <a:effectRef idx="0">
-              <a:schemeClr val="accent1"/>
-            </a:effectRef>
-            <a:fontRef idx="minor">
-              <a:schemeClr val="lt1"/>
-            </a:fontRef>
-          </p:style>
-          <p:txBody>
-            <a:bodyPr rtlCol="0" anchor="ctr"/>
-            <a:lstStyle/>
-            <a:p>
-              <a:pPr marL="285750" indent="-285750">
-                <a:buFontTx/>
-                <a:buChar char="-"/>
-              </a:pPr>
-              <a:r>
-                <a:rPr lang="en-AU" sz="1400" dirty="0">
-                  <a:ln w="0"/>
-                  <a:solidFill>
-                    <a:schemeClr val="tx1"/>
-                  </a:solidFill>
-                  <a:effectLst>
-                    <a:outerShdw blurRad="38100" dist="19050" dir="2700000" algn="tl" rotWithShape="0">
-                      <a:schemeClr val="dk1">
-                        <a:alpha val="40000"/>
-                      </a:schemeClr>
-                    </a:outerShdw>
-                  </a:effectLst>
-                </a:rPr>
-                <a:t>Treatment $</a:t>
-              </a:r>
-            </a:p>
-            <a:p>
-              <a:pPr marL="285750" indent="-285750">
-                <a:buFontTx/>
-                <a:buChar char="-"/>
-              </a:pPr>
-              <a:r>
-                <a:rPr lang="en-AU" sz="1400" dirty="0">
-                  <a:ln w="0"/>
-                  <a:solidFill>
-                    <a:schemeClr val="tx1"/>
-                  </a:solidFill>
-                  <a:effectLst>
-                    <a:outerShdw blurRad="38100" dist="19050" dir="2700000" algn="tl" rotWithShape="0">
-                      <a:schemeClr val="dk1">
-                        <a:alpha val="40000"/>
-                      </a:schemeClr>
-                    </a:outerShdw>
-                  </a:effectLst>
-                </a:rPr>
-                <a:t>Treatment is effective</a:t>
-              </a:r>
-            </a:p>
-            <a:p>
-              <a:pPr marL="285750" indent="-285750">
-                <a:buFontTx/>
-                <a:buChar char="-"/>
-              </a:pPr>
-              <a:r>
-                <a:rPr lang="en-AU" sz="1400" dirty="0">
-                  <a:ln w="0"/>
-                  <a:solidFill>
-                    <a:schemeClr val="tx1"/>
-                  </a:solidFill>
-                  <a:effectLst>
-                    <a:outerShdw blurRad="38100" dist="19050" dir="2700000" algn="tl" rotWithShape="0">
-                      <a:schemeClr val="dk1">
-                        <a:alpha val="40000"/>
-                      </a:schemeClr>
-                    </a:outerShdw>
-                  </a:effectLst>
-                </a:rPr>
-                <a:t>Outcome $$$</a:t>
-              </a:r>
-            </a:p>
-            <a:p>
-              <a:pPr marL="285750" indent="-285750">
-                <a:buFontTx/>
-                <a:buChar char="-"/>
-              </a:pPr>
-              <a:r>
-                <a:rPr lang="en-AU" sz="1400" dirty="0">
-                  <a:ln w="0"/>
-                  <a:solidFill>
-                    <a:schemeClr val="tx1"/>
-                  </a:solidFill>
-                  <a:effectLst>
-                    <a:outerShdw blurRad="38100" dist="19050" dir="2700000" algn="tl" rotWithShape="0">
-                      <a:schemeClr val="dk1">
-                        <a:alpha val="40000"/>
-                      </a:schemeClr>
-                    </a:outerShdw>
-                  </a:effectLst>
-                </a:rPr>
-                <a:t>Outcome is common</a:t>
-              </a:r>
-            </a:p>
-            <a:p>
-              <a:pPr marL="285750" indent="-285750">
-                <a:buFontTx/>
-                <a:buChar char="-"/>
-              </a:pPr>
-              <a:r>
-                <a:rPr lang="en-AU" sz="1400" dirty="0">
-                  <a:ln w="0"/>
-                  <a:solidFill>
-                    <a:schemeClr val="tx1"/>
-                  </a:solidFill>
-                  <a:effectLst>
-                    <a:outerShdw blurRad="38100" dist="19050" dir="2700000" algn="tl" rotWithShape="0">
-                      <a:schemeClr val="dk1">
-                        <a:alpha val="40000"/>
-                      </a:schemeClr>
-                    </a:outerShdw>
-                  </a:effectLst>
-                </a:rPr>
-                <a:t>Is cheap and effective relative to outcome being prevented</a:t>
-              </a:r>
-            </a:p>
-          </p:txBody>
-        </p:sp>
       </p:grpSp>
+      <p:sp>
+        <p:nvSpPr>
+          <p:cNvPr id="7" name="Rectangle: Rounded Corners 6">
+            <a:extLst>
+              <a:ext uri="{FF2B5EF4-FFF2-40B4-BE49-F238E27FC236}">
+                <a16:creationId xmlns:a16="http://schemas.microsoft.com/office/drawing/2014/main" id="{31D3C340-6863-259C-1639-AD7B55F2A539}"/>
+              </a:ext>
+            </a:extLst>
+          </p:cNvPr>
+          <p:cNvSpPr/>
+          <p:nvPr/>
+        </p:nvSpPr>
+        <p:spPr>
+          <a:xfrm>
+            <a:off x="9085190" y="4069940"/>
+            <a:ext cx="2308483" cy="1302153"/>
+          </a:xfrm>
+          <a:prstGeom prst="roundRect">
+            <a:avLst/>
+          </a:prstGeom>
+          <a:solidFill>
+            <a:schemeClr val="accent2">
+              <a:lumMod val="40000"/>
+              <a:lumOff val="60000"/>
+            </a:schemeClr>
+          </a:solidFill>
+        </p:spPr>
+        <p:style>
+          <a:lnRef idx="2">
+            <a:schemeClr val="accent1">
+              <a:shade val="15000"/>
+            </a:schemeClr>
+          </a:lnRef>
+          <a:fillRef idx="1">
+            <a:schemeClr val="accent1"/>
+          </a:fillRef>
+          <a:effectRef idx="0">
+            <a:schemeClr val="accent1"/>
+          </a:effectRef>
+          <a:fontRef idx="minor">
+            <a:schemeClr val="lt1"/>
+          </a:fontRef>
+        </p:style>
+        <p:txBody>
+          <a:bodyPr rtlCol="0" anchor="ctr"/>
+          <a:lstStyle/>
+          <a:p>
+            <a:pPr marL="285750" indent="-285750">
+              <a:buFontTx/>
+              <a:buChar char="-"/>
+            </a:pPr>
+            <a:r>
+              <a:rPr lang="en-AU" sz="1400" dirty="0">
+                <a:ln w="0"/>
+                <a:solidFill>
+                  <a:schemeClr val="tx1"/>
+                </a:solidFill>
+                <a:effectLst>
+                  <a:outerShdw blurRad="38100" dist="19050" dir="2700000" algn="tl" rotWithShape="0">
+                    <a:schemeClr val="dk1">
+                      <a:alpha val="40000"/>
+                    </a:schemeClr>
+                  </a:outerShdw>
+                </a:effectLst>
+              </a:rPr>
+              <a:t>Treatment $</a:t>
+            </a:r>
+          </a:p>
+          <a:p>
+            <a:pPr marL="285750" indent="-285750">
+              <a:buFontTx/>
+              <a:buChar char="-"/>
+            </a:pPr>
+            <a:r>
+              <a:rPr lang="en-AU" sz="1400" dirty="0">
+                <a:ln w="0"/>
+                <a:solidFill>
+                  <a:schemeClr val="tx1"/>
+                </a:solidFill>
+                <a:effectLst>
+                  <a:outerShdw blurRad="38100" dist="19050" dir="2700000" algn="tl" rotWithShape="0">
+                    <a:schemeClr val="dk1">
+                      <a:alpha val="40000"/>
+                    </a:schemeClr>
+                  </a:outerShdw>
+                </a:effectLst>
+              </a:rPr>
+              <a:t>Treatment is effective</a:t>
+            </a:r>
+          </a:p>
+          <a:p>
+            <a:pPr marL="285750" indent="-285750">
+              <a:buFontTx/>
+              <a:buChar char="-"/>
+            </a:pPr>
+            <a:r>
+              <a:rPr lang="en-AU" sz="1400" dirty="0">
+                <a:ln w="0"/>
+                <a:solidFill>
+                  <a:schemeClr val="tx1"/>
+                </a:solidFill>
+                <a:effectLst>
+                  <a:outerShdw blurRad="38100" dist="19050" dir="2700000" algn="tl" rotWithShape="0">
+                    <a:schemeClr val="dk1">
+                      <a:alpha val="40000"/>
+                    </a:schemeClr>
+                  </a:outerShdw>
+                </a:effectLst>
+              </a:rPr>
+              <a:t>Outcome $$$</a:t>
+            </a:r>
+          </a:p>
+          <a:p>
+            <a:pPr marL="285750" indent="-285750">
+              <a:buFontTx/>
+              <a:buChar char="-"/>
+            </a:pPr>
+            <a:r>
+              <a:rPr lang="en-AU" sz="1400" dirty="0">
+                <a:ln w="0"/>
+                <a:solidFill>
+                  <a:schemeClr val="tx1"/>
+                </a:solidFill>
+                <a:effectLst>
+                  <a:outerShdw blurRad="38100" dist="19050" dir="2700000" algn="tl" rotWithShape="0">
+                    <a:schemeClr val="dk1">
+                      <a:alpha val="40000"/>
+                    </a:schemeClr>
+                  </a:outerShdw>
+                </a:effectLst>
+              </a:rPr>
+              <a:t>Outcome is common</a:t>
+            </a:r>
+          </a:p>
+        </p:txBody>
+      </p:sp>
     </p:spTree>
     <p:extLst>
       <p:ext uri="{BB962C8B-B14F-4D97-AF65-F5344CB8AC3E}">

</xml_diff>

<commit_message>
fix up images and table size
</commit_message>
<xml_diff>
--- a/graphics.pptx
+++ b/graphics.pptx
@@ -8,9 +8,9 @@
     <p:notesMasterId r:id="rId6"/>
   </p:notesMasterIdLst>
   <p:sldIdLst>
-    <p:sldId id="258" r:id="rId2"/>
-    <p:sldId id="262" r:id="rId3"/>
-    <p:sldId id="264" r:id="rId4"/>
+    <p:sldId id="264" r:id="rId2"/>
+    <p:sldId id="266" r:id="rId3"/>
+    <p:sldId id="265" r:id="rId4"/>
     <p:sldId id="263" r:id="rId5"/>
   </p:sldIdLst>
   <p:sldSz cx="12192000" cy="6858000"/>
@@ -200,7 +200,7 @@
           <a:p>
             <a:fld id="{DE2C9833-FA57-4813-8EED-51B9CE783BC8}" type="datetimeFigureOut">
               <a:rPr lang="en-AU" smtClean="0"/>
-              <a:t>23/08/2023</a:t>
+              <a:t>24/08/2023</a:t>
             </a:fld>
             <a:endParaRPr lang="en-AU"/>
           </a:p>
@@ -617,7 +617,7 @@
           <a:p>
             <a:fld id="{8B2D4AC2-C4E8-42C3-BDA3-4F9AA189E032}" type="datetimeFigureOut">
               <a:rPr lang="en-AU" smtClean="0"/>
-              <a:t>23/08/2023</a:t>
+              <a:t>24/08/2023</a:t>
             </a:fld>
             <a:endParaRPr lang="en-AU"/>
           </a:p>
@@ -817,7 +817,7 @@
           <a:p>
             <a:fld id="{8B2D4AC2-C4E8-42C3-BDA3-4F9AA189E032}" type="datetimeFigureOut">
               <a:rPr lang="en-AU" smtClean="0"/>
-              <a:t>23/08/2023</a:t>
+              <a:t>24/08/2023</a:t>
             </a:fld>
             <a:endParaRPr lang="en-AU"/>
           </a:p>
@@ -1027,7 +1027,7 @@
           <a:p>
             <a:fld id="{8B2D4AC2-C4E8-42C3-BDA3-4F9AA189E032}" type="datetimeFigureOut">
               <a:rPr lang="en-AU" smtClean="0"/>
-              <a:t>23/08/2023</a:t>
+              <a:t>24/08/2023</a:t>
             </a:fld>
             <a:endParaRPr lang="en-AU"/>
           </a:p>
@@ -1227,7 +1227,7 @@
           <a:p>
             <a:fld id="{8B2D4AC2-C4E8-42C3-BDA3-4F9AA189E032}" type="datetimeFigureOut">
               <a:rPr lang="en-AU" smtClean="0"/>
-              <a:t>23/08/2023</a:t>
+              <a:t>24/08/2023</a:t>
             </a:fld>
             <a:endParaRPr lang="en-AU"/>
           </a:p>
@@ -1503,7 +1503,7 @@
           <a:p>
             <a:fld id="{8B2D4AC2-C4E8-42C3-BDA3-4F9AA189E032}" type="datetimeFigureOut">
               <a:rPr lang="en-AU" smtClean="0"/>
-              <a:t>23/08/2023</a:t>
+              <a:t>24/08/2023</a:t>
             </a:fld>
             <a:endParaRPr lang="en-AU"/>
           </a:p>
@@ -1771,7 +1771,7 @@
           <a:p>
             <a:fld id="{8B2D4AC2-C4E8-42C3-BDA3-4F9AA189E032}" type="datetimeFigureOut">
               <a:rPr lang="en-AU" smtClean="0"/>
-              <a:t>23/08/2023</a:t>
+              <a:t>24/08/2023</a:t>
             </a:fld>
             <a:endParaRPr lang="en-AU"/>
           </a:p>
@@ -2186,7 +2186,7 @@
           <a:p>
             <a:fld id="{8B2D4AC2-C4E8-42C3-BDA3-4F9AA189E032}" type="datetimeFigureOut">
               <a:rPr lang="en-AU" smtClean="0"/>
-              <a:t>23/08/2023</a:t>
+              <a:t>24/08/2023</a:t>
             </a:fld>
             <a:endParaRPr lang="en-AU"/>
           </a:p>
@@ -2328,7 +2328,7 @@
           <a:p>
             <a:fld id="{8B2D4AC2-C4E8-42C3-BDA3-4F9AA189E032}" type="datetimeFigureOut">
               <a:rPr lang="en-AU" smtClean="0"/>
-              <a:t>23/08/2023</a:t>
+              <a:t>24/08/2023</a:t>
             </a:fld>
             <a:endParaRPr lang="en-AU"/>
           </a:p>
@@ -2441,7 +2441,7 @@
           <a:p>
             <a:fld id="{8B2D4AC2-C4E8-42C3-BDA3-4F9AA189E032}" type="datetimeFigureOut">
               <a:rPr lang="en-AU" smtClean="0"/>
-              <a:t>23/08/2023</a:t>
+              <a:t>24/08/2023</a:t>
             </a:fld>
             <a:endParaRPr lang="en-AU"/>
           </a:p>
@@ -2754,7 +2754,7 @@
           <a:p>
             <a:fld id="{8B2D4AC2-C4E8-42C3-BDA3-4F9AA189E032}" type="datetimeFigureOut">
               <a:rPr lang="en-AU" smtClean="0"/>
-              <a:t>23/08/2023</a:t>
+              <a:t>24/08/2023</a:t>
             </a:fld>
             <a:endParaRPr lang="en-AU"/>
           </a:p>
@@ -3043,7 +3043,7 @@
           <a:p>
             <a:fld id="{8B2D4AC2-C4E8-42C3-BDA3-4F9AA189E032}" type="datetimeFigureOut">
               <a:rPr lang="en-AU" smtClean="0"/>
-              <a:t>23/08/2023</a:t>
+              <a:t>24/08/2023</a:t>
             </a:fld>
             <a:endParaRPr lang="en-AU"/>
           </a:p>
@@ -3286,7 +3286,7 @@
           <a:p>
             <a:fld id="{8B2D4AC2-C4E8-42C3-BDA3-4F9AA189E032}" type="datetimeFigureOut">
               <a:rPr lang="en-AU" smtClean="0"/>
-              <a:t>23/08/2023</a:t>
+              <a:t>24/08/2023</a:t>
             </a:fld>
             <a:endParaRPr lang="en-AU"/>
           </a:p>
@@ -3705,10 +3705,10 @@
       </p:grpSpPr>
       <p:grpSp>
         <p:nvGrpSpPr>
-          <p:cNvPr id="7" name="Group 6">
-            <a:extLst>
-              <a:ext uri="{FF2B5EF4-FFF2-40B4-BE49-F238E27FC236}">
-                <a16:creationId xmlns:a16="http://schemas.microsoft.com/office/drawing/2014/main" id="{215BA49C-2989-28B6-9B28-0CBCF50836A6}"/>
+          <p:cNvPr id="6" name="Group 5">
+            <a:extLst>
+              <a:ext uri="{FF2B5EF4-FFF2-40B4-BE49-F238E27FC236}">
+                <a16:creationId xmlns:a16="http://schemas.microsoft.com/office/drawing/2014/main" id="{32B93117-8865-7572-1510-094113FB63A1}"/>
               </a:ext>
             </a:extLst>
           </p:cNvPr>
@@ -3725,10 +3725,10 @@
         </p:grpSpPr>
         <p:sp>
           <p:nvSpPr>
-            <p:cNvPr id="9" name="Rectangle: Rounded Corners 8">
+            <p:cNvPr id="4" name="Rectangle: Rounded Corners 3">
               <a:extLst>
                 <a:ext uri="{FF2B5EF4-FFF2-40B4-BE49-F238E27FC236}">
-                  <a16:creationId xmlns:a16="http://schemas.microsoft.com/office/drawing/2014/main" id="{E421F80D-AC3D-0827-9F97-54F7820A066E}"/>
+                  <a16:creationId xmlns:a16="http://schemas.microsoft.com/office/drawing/2014/main" id="{AC007EA7-87DB-A600-ECAE-CB58B3CFC3FC}"/>
                 </a:ext>
               </a:extLst>
             </p:cNvPr>
@@ -3775,10 +3775,10 @@
         </p:sp>
         <p:cxnSp>
           <p:nvCxnSpPr>
-            <p:cNvPr id="10" name="Straight Arrow Connector 9">
+            <p:cNvPr id="8" name="Straight Arrow Connector 7">
               <a:extLst>
                 <a:ext uri="{FF2B5EF4-FFF2-40B4-BE49-F238E27FC236}">
-                  <a16:creationId xmlns:a16="http://schemas.microsoft.com/office/drawing/2014/main" id="{21A4D4FC-806C-7CDA-4323-FCB739F3BA13}"/>
+                  <a16:creationId xmlns:a16="http://schemas.microsoft.com/office/drawing/2014/main" id="{4694EA76-79CE-1E0E-896C-ADF2DCE89F8D}"/>
                 </a:ext>
               </a:extLst>
             </p:cNvPr>
@@ -3817,10 +3817,10 @@
         </p:cxnSp>
         <p:sp>
           <p:nvSpPr>
-            <p:cNvPr id="16" name="Rectangle: Rounded Corners 15">
+            <p:cNvPr id="11" name="Rectangle: Rounded Corners 10">
               <a:extLst>
                 <a:ext uri="{FF2B5EF4-FFF2-40B4-BE49-F238E27FC236}">
-                  <a16:creationId xmlns:a16="http://schemas.microsoft.com/office/drawing/2014/main" id="{15046E58-CC9D-E185-B773-8B76EDD690E2}"/>
+                  <a16:creationId xmlns:a16="http://schemas.microsoft.com/office/drawing/2014/main" id="{EB25F84B-0017-B94E-2CF6-35AE7D1A1585}"/>
                 </a:ext>
               </a:extLst>
             </p:cNvPr>
@@ -3867,10 +3867,10 @@
         </p:sp>
         <p:sp>
           <p:nvSpPr>
-            <p:cNvPr id="17" name="Rectangle: Rounded Corners 16">
+            <p:cNvPr id="12" name="Rectangle: Rounded Corners 11">
               <a:extLst>
                 <a:ext uri="{FF2B5EF4-FFF2-40B4-BE49-F238E27FC236}">
-                  <a16:creationId xmlns:a16="http://schemas.microsoft.com/office/drawing/2014/main" id="{78C497C3-C397-6C59-EC45-3092440A5159}"/>
+                  <a16:creationId xmlns:a16="http://schemas.microsoft.com/office/drawing/2014/main" id="{BE02F48B-63AE-412B-2EDA-9E5A66284074}"/>
                 </a:ext>
               </a:extLst>
             </p:cNvPr>
@@ -3926,7 +3926,7 @@
     </p:spTree>
     <p:extLst>
       <p:ext uri="{BB962C8B-B14F-4D97-AF65-F5344CB8AC3E}">
-        <p14:creationId xmlns:p14="http://schemas.microsoft.com/office/powerpoint/2010/main" val="3317454910"/>
+        <p14:creationId xmlns:p14="http://schemas.microsoft.com/office/powerpoint/2010/main" val="654013107"/>
       </p:ext>
     </p:extLst>
   </p:cSld>
@@ -4325,7 +4325,7 @@
     </p:spTree>
     <p:extLst>
       <p:ext uri="{BB962C8B-B14F-4D97-AF65-F5344CB8AC3E}">
-        <p14:creationId xmlns:p14="http://schemas.microsoft.com/office/powerpoint/2010/main" val="2880099902"/>
+        <p14:creationId xmlns:p14="http://schemas.microsoft.com/office/powerpoint/2010/main" val="1431350457"/>
       </p:ext>
     </p:extLst>
   </p:cSld>
@@ -4860,7 +4860,7 @@
     </p:spTree>
     <p:extLst>
       <p:ext uri="{BB962C8B-B14F-4D97-AF65-F5344CB8AC3E}">
-        <p14:creationId xmlns:p14="http://schemas.microsoft.com/office/powerpoint/2010/main" val="654013107"/>
+        <p14:creationId xmlns:p14="http://schemas.microsoft.com/office/powerpoint/2010/main" val="3248110778"/>
       </p:ext>
     </p:extLst>
   </p:cSld>

</xml_diff>

<commit_message>
add extra part to continuum slides
</commit_message>
<xml_diff>
--- a/graphics.pptx
+++ b/graphics.pptx
@@ -5,13 +5,16 @@
     <p:sldMasterId id="2147483648" r:id="rId1"/>
   </p:sldMasterIdLst>
   <p:notesMasterIdLst>
-    <p:notesMasterId r:id="rId6"/>
+    <p:notesMasterId r:id="rId9"/>
   </p:notesMasterIdLst>
   <p:sldIdLst>
     <p:sldId id="264" r:id="rId2"/>
     <p:sldId id="266" r:id="rId3"/>
     <p:sldId id="265" r:id="rId4"/>
     <p:sldId id="263" r:id="rId5"/>
+    <p:sldId id="268" r:id="rId6"/>
+    <p:sldId id="269" r:id="rId7"/>
+    <p:sldId id="267" r:id="rId8"/>
   </p:sldIdLst>
   <p:sldSz cx="12192000" cy="6858000"/>
   <p:notesSz cx="6858000" cy="9144000"/>
@@ -5541,6 +5544,1635 @@
 </p:sld>
 </file>
 
+<file path=ppt/slides/slide5.xml><?xml version="1.0" encoding="utf-8"?>
+<p:sld xmlns:a="http://schemas.openxmlformats.org/drawingml/2006/main" xmlns:r="http://schemas.openxmlformats.org/officeDocument/2006/relationships" xmlns:p="http://schemas.openxmlformats.org/presentationml/2006/main">
+  <p:cSld>
+    <p:spTree>
+      <p:nvGrpSpPr>
+        <p:cNvPr id="1" name=""/>
+        <p:cNvGrpSpPr/>
+        <p:nvPr/>
+      </p:nvGrpSpPr>
+      <p:grpSpPr>
+        <a:xfrm>
+          <a:off x="0" y="0"/>
+          <a:ext cx="0" cy="0"/>
+          <a:chOff x="0" y="0"/>
+          <a:chExt cx="0" cy="0"/>
+        </a:xfrm>
+      </p:grpSpPr>
+      <p:grpSp>
+        <p:nvGrpSpPr>
+          <p:cNvPr id="5" name="Group 4">
+            <a:extLst>
+              <a:ext uri="{FF2B5EF4-FFF2-40B4-BE49-F238E27FC236}">
+                <a16:creationId xmlns:a16="http://schemas.microsoft.com/office/drawing/2014/main" id="{47160ABE-9B7F-A255-90CF-BE1702B5E838}"/>
+              </a:ext>
+            </a:extLst>
+          </p:cNvPr>
+          <p:cNvGrpSpPr/>
+          <p:nvPr/>
+        </p:nvGrpSpPr>
+        <p:grpSpPr>
+          <a:xfrm>
+            <a:off x="773942" y="716221"/>
+            <a:ext cx="10644115" cy="2383191"/>
+            <a:chOff x="749558" y="2988904"/>
+            <a:chExt cx="10644115" cy="2383191"/>
+          </a:xfrm>
+        </p:grpSpPr>
+        <p:grpSp>
+          <p:nvGrpSpPr>
+            <p:cNvPr id="6" name="Group 5">
+              <a:extLst>
+                <a:ext uri="{FF2B5EF4-FFF2-40B4-BE49-F238E27FC236}">
+                  <a16:creationId xmlns:a16="http://schemas.microsoft.com/office/drawing/2014/main" id="{32B93117-8865-7572-1510-094113FB63A1}"/>
+                </a:ext>
+              </a:extLst>
+            </p:cNvPr>
+            <p:cNvGrpSpPr/>
+            <p:nvPr/>
+          </p:nvGrpSpPr>
+          <p:grpSpPr>
+            <a:xfrm>
+              <a:off x="749558" y="2988904"/>
+              <a:ext cx="10644115" cy="2383191"/>
+              <a:chOff x="749558" y="2988904"/>
+              <a:chExt cx="10024189" cy="2383191"/>
+            </a:xfrm>
+          </p:grpSpPr>
+          <p:sp>
+            <p:nvSpPr>
+              <p:cNvPr id="4" name="Rectangle: Rounded Corners 3">
+                <a:extLst>
+                  <a:ext uri="{FF2B5EF4-FFF2-40B4-BE49-F238E27FC236}">
+                    <a16:creationId xmlns:a16="http://schemas.microsoft.com/office/drawing/2014/main" id="{AC007EA7-87DB-A600-ECAE-CB58B3CFC3FC}"/>
+                  </a:ext>
+                </a:extLst>
+              </p:cNvPr>
+              <p:cNvSpPr/>
+              <p:nvPr/>
+            </p:nvSpPr>
+            <p:spPr>
+              <a:xfrm>
+                <a:off x="8633926" y="2988905"/>
+                <a:ext cx="2139821" cy="827315"/>
+              </a:xfrm>
+              <a:prstGeom prst="roundRect">
+                <a:avLst/>
+              </a:prstGeom>
+            </p:spPr>
+            <p:style>
+              <a:lnRef idx="2">
+                <a:schemeClr val="accent1">
+                  <a:shade val="15000"/>
+                </a:schemeClr>
+              </a:lnRef>
+              <a:fillRef idx="1">
+                <a:schemeClr val="accent1"/>
+              </a:fillRef>
+              <a:effectRef idx="0">
+                <a:schemeClr val="accent1"/>
+              </a:effectRef>
+              <a:fontRef idx="minor">
+                <a:schemeClr val="lt1"/>
+              </a:fontRef>
+            </p:style>
+            <p:txBody>
+              <a:bodyPr rtlCol="0" anchor="ctr"/>
+              <a:lstStyle/>
+              <a:p>
+                <a:pPr algn="ctr"/>
+                <a:r>
+                  <a:rPr lang="en-US" dirty="0"/>
+                  <a:t>TREAT EVERYONE</a:t>
+                </a:r>
+                <a:endParaRPr lang="en-AU" dirty="0"/>
+              </a:p>
+            </p:txBody>
+          </p:sp>
+          <p:cxnSp>
+            <p:nvCxnSpPr>
+              <p:cNvPr id="8" name="Straight Arrow Connector 7">
+                <a:extLst>
+                  <a:ext uri="{FF2B5EF4-FFF2-40B4-BE49-F238E27FC236}">
+                    <a16:creationId xmlns:a16="http://schemas.microsoft.com/office/drawing/2014/main" id="{4694EA76-79CE-1E0E-896C-ADF2DCE89F8D}"/>
+                  </a:ext>
+                </a:extLst>
+              </p:cNvPr>
+              <p:cNvCxnSpPr>
+                <a:cxnSpLocks/>
+              </p:cNvCxnSpPr>
+              <p:nvPr/>
+            </p:nvCxnSpPr>
+            <p:spPr>
+              <a:xfrm>
+                <a:off x="783771" y="3943739"/>
+                <a:ext cx="9989976" cy="0"/>
+              </a:xfrm>
+              <a:prstGeom prst="straightConnector1">
+                <a:avLst/>
+              </a:prstGeom>
+              <a:ln w="57150">
+                <a:headEnd type="triangle"/>
+                <a:tailEnd type="triangle"/>
+              </a:ln>
+            </p:spPr>
+            <p:style>
+              <a:lnRef idx="1">
+                <a:schemeClr val="dk1"/>
+              </a:lnRef>
+              <a:fillRef idx="0">
+                <a:schemeClr val="dk1"/>
+              </a:fillRef>
+              <a:effectRef idx="0">
+                <a:schemeClr val="dk1"/>
+              </a:effectRef>
+              <a:fontRef idx="minor">
+                <a:schemeClr val="tx1"/>
+              </a:fontRef>
+            </p:style>
+          </p:cxnSp>
+          <p:sp>
+            <p:nvSpPr>
+              <p:cNvPr id="11" name="Rectangle: Rounded Corners 10">
+                <a:extLst>
+                  <a:ext uri="{FF2B5EF4-FFF2-40B4-BE49-F238E27FC236}">
+                    <a16:creationId xmlns:a16="http://schemas.microsoft.com/office/drawing/2014/main" id="{EB25F84B-0017-B94E-2CF6-35AE7D1A1585}"/>
+                  </a:ext>
+                </a:extLst>
+              </p:cNvPr>
+              <p:cNvSpPr/>
+              <p:nvPr/>
+            </p:nvSpPr>
+            <p:spPr>
+              <a:xfrm>
+                <a:off x="783771" y="2988904"/>
+                <a:ext cx="2139821" cy="827315"/>
+              </a:xfrm>
+              <a:prstGeom prst="roundRect">
+                <a:avLst/>
+              </a:prstGeom>
+            </p:spPr>
+            <p:style>
+              <a:lnRef idx="2">
+                <a:schemeClr val="accent1">
+                  <a:shade val="15000"/>
+                </a:schemeClr>
+              </a:lnRef>
+              <a:fillRef idx="1">
+                <a:schemeClr val="accent1"/>
+              </a:fillRef>
+              <a:effectRef idx="0">
+                <a:schemeClr val="accent1"/>
+              </a:effectRef>
+              <a:fontRef idx="minor">
+                <a:schemeClr val="lt1"/>
+              </a:fontRef>
+            </p:style>
+            <p:txBody>
+              <a:bodyPr rtlCol="0" anchor="ctr"/>
+              <a:lstStyle/>
+              <a:p>
+                <a:pPr algn="ctr"/>
+                <a:r>
+                  <a:rPr lang="en-US" dirty="0"/>
+                  <a:t>TREAT NO ONE</a:t>
+                </a:r>
+                <a:endParaRPr lang="en-AU" dirty="0"/>
+              </a:p>
+            </p:txBody>
+          </p:sp>
+          <p:sp>
+            <p:nvSpPr>
+              <p:cNvPr id="12" name="Rectangle: Rounded Corners 11">
+                <a:extLst>
+                  <a:ext uri="{FF2B5EF4-FFF2-40B4-BE49-F238E27FC236}">
+                    <a16:creationId xmlns:a16="http://schemas.microsoft.com/office/drawing/2014/main" id="{BE02F48B-63AE-412B-2EDA-9E5A66284074}"/>
+                  </a:ext>
+                </a:extLst>
+              </p:cNvPr>
+              <p:cNvSpPr/>
+              <p:nvPr/>
+            </p:nvSpPr>
+            <p:spPr>
+              <a:xfrm>
+                <a:off x="4708848" y="2988904"/>
+                <a:ext cx="2139821" cy="827315"/>
+              </a:xfrm>
+              <a:prstGeom prst="roundRect">
+                <a:avLst/>
+              </a:prstGeom>
+            </p:spPr>
+            <p:style>
+              <a:lnRef idx="2">
+                <a:schemeClr val="accent1">
+                  <a:shade val="15000"/>
+                </a:schemeClr>
+              </a:lnRef>
+              <a:fillRef idx="1">
+                <a:schemeClr val="accent1"/>
+              </a:fillRef>
+              <a:effectRef idx="0">
+                <a:schemeClr val="accent1"/>
+              </a:effectRef>
+              <a:fontRef idx="minor">
+                <a:schemeClr val="lt1"/>
+              </a:fontRef>
+            </p:style>
+            <p:txBody>
+              <a:bodyPr rtlCol="0" anchor="ctr"/>
+              <a:lstStyle/>
+              <a:p>
+                <a:pPr algn="ctr"/>
+                <a:r>
+                  <a:rPr lang="en-US" dirty="0"/>
+                  <a:t>TREAT SOME </a:t>
+                </a:r>
+                <a:br>
+                  <a:rPr lang="en-US" dirty="0"/>
+                </a:br>
+                <a:r>
+                  <a:rPr lang="en-US" dirty="0"/>
+                  <a:t>(model-guided)</a:t>
+                </a:r>
+                <a:endParaRPr lang="en-AU" dirty="0"/>
+              </a:p>
+            </p:txBody>
+          </p:sp>
+          <p:sp>
+            <p:nvSpPr>
+              <p:cNvPr id="2" name="Rectangle: Rounded Corners 1">
+                <a:extLst>
+                  <a:ext uri="{FF2B5EF4-FFF2-40B4-BE49-F238E27FC236}">
+                    <a16:creationId xmlns:a16="http://schemas.microsoft.com/office/drawing/2014/main" id="{1099D08B-7D26-AE27-8797-9B91356EDFF5}"/>
+                  </a:ext>
+                </a:extLst>
+              </p:cNvPr>
+              <p:cNvSpPr/>
+              <p:nvPr/>
+            </p:nvSpPr>
+            <p:spPr>
+              <a:xfrm>
+                <a:off x="749558" y="4069940"/>
+                <a:ext cx="2208245" cy="1302155"/>
+              </a:xfrm>
+              <a:prstGeom prst="roundRect">
+                <a:avLst/>
+              </a:prstGeom>
+              <a:solidFill>
+                <a:schemeClr val="accent2">
+                  <a:lumMod val="40000"/>
+                  <a:lumOff val="60000"/>
+                </a:schemeClr>
+              </a:solidFill>
+            </p:spPr>
+            <p:style>
+              <a:lnRef idx="2">
+                <a:schemeClr val="accent1">
+                  <a:shade val="15000"/>
+                </a:schemeClr>
+              </a:lnRef>
+              <a:fillRef idx="1">
+                <a:schemeClr val="accent1"/>
+              </a:fillRef>
+              <a:effectRef idx="0">
+                <a:schemeClr val="accent1"/>
+              </a:effectRef>
+              <a:fontRef idx="minor">
+                <a:schemeClr val="lt1"/>
+              </a:fontRef>
+            </p:style>
+            <p:txBody>
+              <a:bodyPr rtlCol="0" anchor="ctr"/>
+              <a:lstStyle/>
+              <a:p>
+                <a:pPr marL="285750" indent="-285750">
+                  <a:buFontTx/>
+                  <a:buChar char="-"/>
+                </a:pPr>
+                <a:r>
+                  <a:rPr lang="en-US" sz="1400" dirty="0">
+                    <a:ln w="0"/>
+                    <a:solidFill>
+                      <a:schemeClr val="tx1"/>
+                    </a:solidFill>
+                    <a:effectLst>
+                      <a:outerShdw blurRad="38100" dist="19050" dir="2700000" algn="tl" rotWithShape="0">
+                        <a:schemeClr val="dk1">
+                          <a:alpha val="40000"/>
+                        </a:schemeClr>
+                      </a:outerShdw>
+                    </a:effectLst>
+                  </a:rPr>
+                  <a:t>Treatment $$$</a:t>
+                </a:r>
+              </a:p>
+              <a:p>
+                <a:pPr marL="285750" indent="-285750">
+                  <a:buFontTx/>
+                  <a:buChar char="-"/>
+                </a:pPr>
+                <a:r>
+                  <a:rPr lang="en-US" sz="1400" dirty="0">
+                    <a:ln w="0"/>
+                    <a:solidFill>
+                      <a:schemeClr val="tx1"/>
+                    </a:solidFill>
+                    <a:effectLst>
+                      <a:outerShdw blurRad="38100" dist="19050" dir="2700000" algn="tl" rotWithShape="0">
+                        <a:schemeClr val="dk1">
+                          <a:alpha val="40000"/>
+                        </a:schemeClr>
+                      </a:outerShdw>
+                    </a:effectLst>
+                  </a:rPr>
+                  <a:t>Treatment not very effective</a:t>
+                </a:r>
+              </a:p>
+              <a:p>
+                <a:pPr marL="285750" indent="-285750">
+                  <a:buFontTx/>
+                  <a:buChar char="-"/>
+                </a:pPr>
+                <a:r>
+                  <a:rPr lang="en-US" sz="1400" dirty="0">
+                    <a:ln w="0"/>
+                    <a:solidFill>
+                      <a:schemeClr val="tx1"/>
+                    </a:solidFill>
+                    <a:effectLst>
+                      <a:outerShdw blurRad="38100" dist="19050" dir="2700000" algn="tl" rotWithShape="0">
+                        <a:schemeClr val="dk1">
+                          <a:alpha val="40000"/>
+                        </a:schemeClr>
+                      </a:outerShdw>
+                    </a:effectLst>
+                  </a:rPr>
+                  <a:t>Outcome $</a:t>
+                </a:r>
+              </a:p>
+              <a:p>
+                <a:pPr marL="285750" indent="-285750">
+                  <a:buFontTx/>
+                  <a:buChar char="-"/>
+                </a:pPr>
+                <a:r>
+                  <a:rPr lang="en-US" sz="1400" dirty="0">
+                    <a:ln w="0"/>
+                    <a:solidFill>
+                      <a:schemeClr val="tx1"/>
+                    </a:solidFill>
+                    <a:effectLst>
+                      <a:outerShdw blurRad="38100" dist="19050" dir="2700000" algn="tl" rotWithShape="0">
+                        <a:schemeClr val="dk1">
+                          <a:alpha val="40000"/>
+                        </a:schemeClr>
+                      </a:outerShdw>
+                    </a:effectLst>
+                  </a:rPr>
+                  <a:t>Outcome is rare</a:t>
+                </a:r>
+                <a:endParaRPr lang="en-AU" sz="1400" dirty="0">
+                  <a:ln w="0"/>
+                  <a:solidFill>
+                    <a:schemeClr val="tx1"/>
+                  </a:solidFill>
+                  <a:effectLst>
+                    <a:outerShdw blurRad="38100" dist="19050" dir="2700000" algn="tl" rotWithShape="0">
+                      <a:schemeClr val="dk1">
+                        <a:alpha val="40000"/>
+                      </a:schemeClr>
+                    </a:outerShdw>
+                  </a:effectLst>
+                </a:endParaRPr>
+              </a:p>
+            </p:txBody>
+          </p:sp>
+          <p:sp>
+            <p:nvSpPr>
+              <p:cNvPr id="3" name="Rectangle: Rounded Corners 2">
+                <a:extLst>
+                  <a:ext uri="{FF2B5EF4-FFF2-40B4-BE49-F238E27FC236}">
+                    <a16:creationId xmlns:a16="http://schemas.microsoft.com/office/drawing/2014/main" id="{6027315E-E322-B2F8-43D3-022EC2CA42E4}"/>
+                  </a:ext>
+                </a:extLst>
+              </p:cNvPr>
+              <p:cNvSpPr/>
+              <p:nvPr/>
+            </p:nvSpPr>
+            <p:spPr>
+              <a:xfrm>
+                <a:off x="4674635" y="4069940"/>
+                <a:ext cx="2208245" cy="1302153"/>
+              </a:xfrm>
+              <a:prstGeom prst="roundRect">
+                <a:avLst/>
+              </a:prstGeom>
+              <a:solidFill>
+                <a:schemeClr val="accent2">
+                  <a:lumMod val="40000"/>
+                  <a:lumOff val="60000"/>
+                </a:schemeClr>
+              </a:solidFill>
+            </p:spPr>
+            <p:style>
+              <a:lnRef idx="2">
+                <a:schemeClr val="accent1">
+                  <a:shade val="15000"/>
+                </a:schemeClr>
+              </a:lnRef>
+              <a:fillRef idx="1">
+                <a:schemeClr val="accent1"/>
+              </a:fillRef>
+              <a:effectRef idx="0">
+                <a:schemeClr val="accent1"/>
+              </a:effectRef>
+              <a:fontRef idx="minor">
+                <a:schemeClr val="lt1"/>
+              </a:fontRef>
+            </p:style>
+            <p:txBody>
+              <a:bodyPr rtlCol="0" anchor="ctr"/>
+              <a:lstStyle/>
+              <a:p>
+                <a:pPr marL="285750" indent="-285750">
+                  <a:buFontTx/>
+                  <a:buChar char="-"/>
+                </a:pPr>
+                <a:r>
+                  <a:rPr lang="en-AU" sz="1400" dirty="0">
+                    <a:ln w="0"/>
+                    <a:solidFill>
+                      <a:schemeClr val="tx1"/>
+                    </a:solidFill>
+                    <a:effectLst>
+                      <a:outerShdw blurRad="38100" dist="19050" dir="2700000" algn="tl" rotWithShape="0">
+                        <a:schemeClr val="dk1">
+                          <a:alpha val="40000"/>
+                        </a:schemeClr>
+                      </a:outerShdw>
+                    </a:effectLst>
+                  </a:rPr>
+                  <a:t>Model performs well</a:t>
+                </a:r>
+              </a:p>
+              <a:p>
+                <a:pPr marL="285750" indent="-285750">
+                  <a:buFontTx/>
+                  <a:buChar char="-"/>
+                </a:pPr>
+                <a:r>
+                  <a:rPr lang="en-AU" sz="1400" dirty="0">
+                    <a:ln w="0"/>
+                    <a:solidFill>
+                      <a:schemeClr val="tx1"/>
+                    </a:solidFill>
+                    <a:effectLst>
+                      <a:outerShdw blurRad="38100" dist="19050" dir="2700000" algn="tl" rotWithShape="0">
+                        <a:schemeClr val="dk1">
+                          <a:alpha val="40000"/>
+                        </a:schemeClr>
+                      </a:outerShdw>
+                    </a:effectLst>
+                  </a:rPr>
+                  <a:t>Treatments $$+</a:t>
+                </a:r>
+              </a:p>
+              <a:p>
+                <a:pPr marL="285750" indent="-285750">
+                  <a:buFontTx/>
+                  <a:buChar char="-"/>
+                </a:pPr>
+                <a:r>
+                  <a:rPr lang="en-AU" sz="1400" dirty="0">
+                    <a:ln w="0"/>
+                    <a:solidFill>
+                      <a:schemeClr val="tx1"/>
+                    </a:solidFill>
+                    <a:effectLst>
+                      <a:outerShdw blurRad="38100" dist="19050" dir="2700000" algn="tl" rotWithShape="0">
+                        <a:schemeClr val="dk1">
+                          <a:alpha val="40000"/>
+                        </a:schemeClr>
+                      </a:outerShdw>
+                    </a:effectLst>
+                  </a:rPr>
+                  <a:t>Outcome $$+</a:t>
+                </a:r>
+              </a:p>
+              <a:p>
+                <a:pPr marL="285750" indent="-285750">
+                  <a:buFontTx/>
+                  <a:buChar char="-"/>
+                </a:pPr>
+                <a:r>
+                  <a:rPr lang="en-AU" sz="1400" dirty="0">
+                    <a:ln w="0"/>
+                    <a:solidFill>
+                      <a:schemeClr val="tx1"/>
+                    </a:solidFill>
+                    <a:effectLst>
+                      <a:outerShdw blurRad="38100" dist="19050" dir="2700000" algn="tl" rotWithShape="0">
+                        <a:schemeClr val="dk1">
+                          <a:alpha val="40000"/>
+                        </a:schemeClr>
+                      </a:outerShdw>
+                    </a:effectLst>
+                  </a:rPr>
+                  <a:t>Intervention being guided is effective</a:t>
+                </a:r>
+              </a:p>
+            </p:txBody>
+          </p:sp>
+        </p:grpSp>
+        <p:sp>
+          <p:nvSpPr>
+            <p:cNvPr id="7" name="Rectangle: Rounded Corners 6">
+              <a:extLst>
+                <a:ext uri="{FF2B5EF4-FFF2-40B4-BE49-F238E27FC236}">
+                  <a16:creationId xmlns:a16="http://schemas.microsoft.com/office/drawing/2014/main" id="{31D3C340-6863-259C-1639-AD7B55F2A539}"/>
+                </a:ext>
+              </a:extLst>
+            </p:cNvPr>
+            <p:cNvSpPr/>
+            <p:nvPr/>
+          </p:nvSpPr>
+          <p:spPr>
+            <a:xfrm>
+              <a:off x="9085190" y="4069940"/>
+              <a:ext cx="2308483" cy="1302153"/>
+            </a:xfrm>
+            <a:prstGeom prst="roundRect">
+              <a:avLst/>
+            </a:prstGeom>
+            <a:solidFill>
+              <a:schemeClr val="accent2">
+                <a:lumMod val="40000"/>
+                <a:lumOff val="60000"/>
+              </a:schemeClr>
+            </a:solidFill>
+          </p:spPr>
+          <p:style>
+            <a:lnRef idx="2">
+              <a:schemeClr val="accent1">
+                <a:shade val="15000"/>
+              </a:schemeClr>
+            </a:lnRef>
+            <a:fillRef idx="1">
+              <a:schemeClr val="accent1"/>
+            </a:fillRef>
+            <a:effectRef idx="0">
+              <a:schemeClr val="accent1"/>
+            </a:effectRef>
+            <a:fontRef idx="minor">
+              <a:schemeClr val="lt1"/>
+            </a:fontRef>
+          </p:style>
+          <p:txBody>
+            <a:bodyPr rtlCol="0" anchor="ctr"/>
+            <a:lstStyle/>
+            <a:p>
+              <a:pPr marL="285750" indent="-285750">
+                <a:buFontTx/>
+                <a:buChar char="-"/>
+              </a:pPr>
+              <a:r>
+                <a:rPr lang="en-AU" sz="1400" dirty="0">
+                  <a:ln w="0"/>
+                  <a:solidFill>
+                    <a:schemeClr val="tx1"/>
+                  </a:solidFill>
+                  <a:effectLst>
+                    <a:outerShdw blurRad="38100" dist="19050" dir="2700000" algn="tl" rotWithShape="0">
+                      <a:schemeClr val="dk1">
+                        <a:alpha val="40000"/>
+                      </a:schemeClr>
+                    </a:outerShdw>
+                  </a:effectLst>
+                </a:rPr>
+                <a:t>Treatment $</a:t>
+              </a:r>
+            </a:p>
+            <a:p>
+              <a:pPr marL="285750" indent="-285750">
+                <a:buFontTx/>
+                <a:buChar char="-"/>
+              </a:pPr>
+              <a:r>
+                <a:rPr lang="en-AU" sz="1400" dirty="0">
+                  <a:ln w="0"/>
+                  <a:solidFill>
+                    <a:schemeClr val="tx1"/>
+                  </a:solidFill>
+                  <a:effectLst>
+                    <a:outerShdw blurRad="38100" dist="19050" dir="2700000" algn="tl" rotWithShape="0">
+                      <a:schemeClr val="dk1">
+                        <a:alpha val="40000"/>
+                      </a:schemeClr>
+                    </a:outerShdw>
+                  </a:effectLst>
+                </a:rPr>
+                <a:t>Treatment is effective</a:t>
+              </a:r>
+            </a:p>
+            <a:p>
+              <a:pPr marL="285750" indent="-285750">
+                <a:buFontTx/>
+                <a:buChar char="-"/>
+              </a:pPr>
+              <a:r>
+                <a:rPr lang="en-AU" sz="1400" dirty="0">
+                  <a:ln w="0"/>
+                  <a:solidFill>
+                    <a:schemeClr val="tx1"/>
+                  </a:solidFill>
+                  <a:effectLst>
+                    <a:outerShdw blurRad="38100" dist="19050" dir="2700000" algn="tl" rotWithShape="0">
+                      <a:schemeClr val="dk1">
+                        <a:alpha val="40000"/>
+                      </a:schemeClr>
+                    </a:outerShdw>
+                  </a:effectLst>
+                </a:rPr>
+                <a:t>Outcome $$$</a:t>
+              </a:r>
+            </a:p>
+            <a:p>
+              <a:pPr marL="285750" indent="-285750">
+                <a:buFontTx/>
+                <a:buChar char="-"/>
+              </a:pPr>
+              <a:r>
+                <a:rPr lang="en-AU" sz="1400" dirty="0">
+                  <a:ln w="0"/>
+                  <a:solidFill>
+                    <a:schemeClr val="tx1"/>
+                  </a:solidFill>
+                  <a:effectLst>
+                    <a:outerShdw blurRad="38100" dist="19050" dir="2700000" algn="tl" rotWithShape="0">
+                      <a:schemeClr val="dk1">
+                        <a:alpha val="40000"/>
+                      </a:schemeClr>
+                    </a:outerShdw>
+                  </a:effectLst>
+                </a:rPr>
+                <a:t>Outcome is common</a:t>
+              </a:r>
+            </a:p>
+          </p:txBody>
+        </p:sp>
+      </p:grpSp>
+    </p:spTree>
+    <p:extLst>
+      <p:ext uri="{BB962C8B-B14F-4D97-AF65-F5344CB8AC3E}">
+        <p14:creationId xmlns:p14="http://schemas.microsoft.com/office/powerpoint/2010/main" val="1739889992"/>
+      </p:ext>
+    </p:extLst>
+  </p:cSld>
+  <p:clrMapOvr>
+    <a:masterClrMapping/>
+  </p:clrMapOvr>
+</p:sld>
+</file>
+
+<file path=ppt/slides/slide6.xml><?xml version="1.0" encoding="utf-8"?>
+<p:sld xmlns:a="http://schemas.openxmlformats.org/drawingml/2006/main" xmlns:r="http://schemas.openxmlformats.org/officeDocument/2006/relationships" xmlns:p="http://schemas.openxmlformats.org/presentationml/2006/main">
+  <p:cSld>
+    <p:spTree>
+      <p:nvGrpSpPr>
+        <p:cNvPr id="1" name=""/>
+        <p:cNvGrpSpPr/>
+        <p:nvPr/>
+      </p:nvGrpSpPr>
+      <p:grpSpPr>
+        <a:xfrm>
+          <a:off x="0" y="0"/>
+          <a:ext cx="0" cy="0"/>
+          <a:chOff x="0" y="0"/>
+          <a:chExt cx="0" cy="0"/>
+        </a:xfrm>
+      </p:grpSpPr>
+      <p:grpSp>
+        <p:nvGrpSpPr>
+          <p:cNvPr id="18" name="Group 17">
+            <a:extLst>
+              <a:ext uri="{FF2B5EF4-FFF2-40B4-BE49-F238E27FC236}">
+                <a16:creationId xmlns:a16="http://schemas.microsoft.com/office/drawing/2014/main" id="{B4B8E945-1C5B-78A0-80CA-9854DA910EB7}"/>
+              </a:ext>
+            </a:extLst>
+          </p:cNvPr>
+          <p:cNvGrpSpPr/>
+          <p:nvPr/>
+        </p:nvGrpSpPr>
+        <p:grpSpPr>
+          <a:xfrm>
+            <a:off x="773942" y="716221"/>
+            <a:ext cx="10644115" cy="4428389"/>
+            <a:chOff x="773942" y="716221"/>
+            <a:chExt cx="10644115" cy="4428389"/>
+          </a:xfrm>
+        </p:grpSpPr>
+        <p:grpSp>
+          <p:nvGrpSpPr>
+            <p:cNvPr id="5" name="Group 4">
+              <a:extLst>
+                <a:ext uri="{FF2B5EF4-FFF2-40B4-BE49-F238E27FC236}">
+                  <a16:creationId xmlns:a16="http://schemas.microsoft.com/office/drawing/2014/main" id="{47160ABE-9B7F-A255-90CF-BE1702B5E838}"/>
+                </a:ext>
+              </a:extLst>
+            </p:cNvPr>
+            <p:cNvGrpSpPr/>
+            <p:nvPr/>
+          </p:nvGrpSpPr>
+          <p:grpSpPr>
+            <a:xfrm>
+              <a:off x="773942" y="716221"/>
+              <a:ext cx="10644115" cy="2383191"/>
+              <a:chOff x="749558" y="2988904"/>
+              <a:chExt cx="10644115" cy="2383191"/>
+            </a:xfrm>
+          </p:grpSpPr>
+          <p:grpSp>
+            <p:nvGrpSpPr>
+              <p:cNvPr id="6" name="Group 5">
+                <a:extLst>
+                  <a:ext uri="{FF2B5EF4-FFF2-40B4-BE49-F238E27FC236}">
+                    <a16:creationId xmlns:a16="http://schemas.microsoft.com/office/drawing/2014/main" id="{32B93117-8865-7572-1510-094113FB63A1}"/>
+                  </a:ext>
+                </a:extLst>
+              </p:cNvPr>
+              <p:cNvGrpSpPr/>
+              <p:nvPr/>
+            </p:nvGrpSpPr>
+            <p:grpSpPr>
+              <a:xfrm>
+                <a:off x="749558" y="2988904"/>
+                <a:ext cx="10644115" cy="2383191"/>
+                <a:chOff x="749558" y="2988904"/>
+                <a:chExt cx="10024189" cy="2383191"/>
+              </a:xfrm>
+            </p:grpSpPr>
+            <p:sp>
+              <p:nvSpPr>
+                <p:cNvPr id="4" name="Rectangle: Rounded Corners 3">
+                  <a:extLst>
+                    <a:ext uri="{FF2B5EF4-FFF2-40B4-BE49-F238E27FC236}">
+                      <a16:creationId xmlns:a16="http://schemas.microsoft.com/office/drawing/2014/main" id="{AC007EA7-87DB-A600-ECAE-CB58B3CFC3FC}"/>
+                    </a:ext>
+                  </a:extLst>
+                </p:cNvPr>
+                <p:cNvSpPr/>
+                <p:nvPr/>
+              </p:nvSpPr>
+              <p:spPr>
+                <a:xfrm>
+                  <a:off x="8633926" y="2988905"/>
+                  <a:ext cx="2139821" cy="827315"/>
+                </a:xfrm>
+                <a:prstGeom prst="roundRect">
+                  <a:avLst/>
+                </a:prstGeom>
+              </p:spPr>
+              <p:style>
+                <a:lnRef idx="2">
+                  <a:schemeClr val="accent1">
+                    <a:shade val="15000"/>
+                  </a:schemeClr>
+                </a:lnRef>
+                <a:fillRef idx="1">
+                  <a:schemeClr val="accent1"/>
+                </a:fillRef>
+                <a:effectRef idx="0">
+                  <a:schemeClr val="accent1"/>
+                </a:effectRef>
+                <a:fontRef idx="minor">
+                  <a:schemeClr val="lt1"/>
+                </a:fontRef>
+              </p:style>
+              <p:txBody>
+                <a:bodyPr rtlCol="0" anchor="ctr"/>
+                <a:lstStyle/>
+                <a:p>
+                  <a:pPr algn="ctr"/>
+                  <a:r>
+                    <a:rPr lang="en-US" dirty="0"/>
+                    <a:t>TREAT EVERYONE</a:t>
+                  </a:r>
+                  <a:endParaRPr lang="en-AU" dirty="0"/>
+                </a:p>
+              </p:txBody>
+            </p:sp>
+            <p:cxnSp>
+              <p:nvCxnSpPr>
+                <p:cNvPr id="8" name="Straight Arrow Connector 7">
+                  <a:extLst>
+                    <a:ext uri="{FF2B5EF4-FFF2-40B4-BE49-F238E27FC236}">
+                      <a16:creationId xmlns:a16="http://schemas.microsoft.com/office/drawing/2014/main" id="{4694EA76-79CE-1E0E-896C-ADF2DCE89F8D}"/>
+                    </a:ext>
+                  </a:extLst>
+                </p:cNvPr>
+                <p:cNvCxnSpPr>
+                  <a:cxnSpLocks/>
+                </p:cNvCxnSpPr>
+                <p:nvPr/>
+              </p:nvCxnSpPr>
+              <p:spPr>
+                <a:xfrm>
+                  <a:off x="783771" y="3943739"/>
+                  <a:ext cx="9989976" cy="0"/>
+                </a:xfrm>
+                <a:prstGeom prst="straightConnector1">
+                  <a:avLst/>
+                </a:prstGeom>
+                <a:ln w="57150">
+                  <a:headEnd type="triangle"/>
+                  <a:tailEnd type="triangle"/>
+                </a:ln>
+              </p:spPr>
+              <p:style>
+                <a:lnRef idx="1">
+                  <a:schemeClr val="dk1"/>
+                </a:lnRef>
+                <a:fillRef idx="0">
+                  <a:schemeClr val="dk1"/>
+                </a:fillRef>
+                <a:effectRef idx="0">
+                  <a:schemeClr val="dk1"/>
+                </a:effectRef>
+                <a:fontRef idx="minor">
+                  <a:schemeClr val="tx1"/>
+                </a:fontRef>
+              </p:style>
+            </p:cxnSp>
+            <p:sp>
+              <p:nvSpPr>
+                <p:cNvPr id="11" name="Rectangle: Rounded Corners 10">
+                  <a:extLst>
+                    <a:ext uri="{FF2B5EF4-FFF2-40B4-BE49-F238E27FC236}">
+                      <a16:creationId xmlns:a16="http://schemas.microsoft.com/office/drawing/2014/main" id="{EB25F84B-0017-B94E-2CF6-35AE7D1A1585}"/>
+                    </a:ext>
+                  </a:extLst>
+                </p:cNvPr>
+                <p:cNvSpPr/>
+                <p:nvPr/>
+              </p:nvSpPr>
+              <p:spPr>
+                <a:xfrm>
+                  <a:off x="783771" y="2988904"/>
+                  <a:ext cx="2139821" cy="827315"/>
+                </a:xfrm>
+                <a:prstGeom prst="roundRect">
+                  <a:avLst/>
+                </a:prstGeom>
+              </p:spPr>
+              <p:style>
+                <a:lnRef idx="2">
+                  <a:schemeClr val="accent1">
+                    <a:shade val="15000"/>
+                  </a:schemeClr>
+                </a:lnRef>
+                <a:fillRef idx="1">
+                  <a:schemeClr val="accent1"/>
+                </a:fillRef>
+                <a:effectRef idx="0">
+                  <a:schemeClr val="accent1"/>
+                </a:effectRef>
+                <a:fontRef idx="minor">
+                  <a:schemeClr val="lt1"/>
+                </a:fontRef>
+              </p:style>
+              <p:txBody>
+                <a:bodyPr rtlCol="0" anchor="ctr"/>
+                <a:lstStyle/>
+                <a:p>
+                  <a:pPr algn="ctr"/>
+                  <a:r>
+                    <a:rPr lang="en-US" dirty="0"/>
+                    <a:t>TREAT NO ONE</a:t>
+                  </a:r>
+                  <a:endParaRPr lang="en-AU" dirty="0"/>
+                </a:p>
+              </p:txBody>
+            </p:sp>
+            <p:sp>
+              <p:nvSpPr>
+                <p:cNvPr id="12" name="Rectangle: Rounded Corners 11">
+                  <a:extLst>
+                    <a:ext uri="{FF2B5EF4-FFF2-40B4-BE49-F238E27FC236}">
+                      <a16:creationId xmlns:a16="http://schemas.microsoft.com/office/drawing/2014/main" id="{BE02F48B-63AE-412B-2EDA-9E5A66284074}"/>
+                    </a:ext>
+                  </a:extLst>
+                </p:cNvPr>
+                <p:cNvSpPr/>
+                <p:nvPr/>
+              </p:nvSpPr>
+              <p:spPr>
+                <a:xfrm>
+                  <a:off x="4708848" y="2988904"/>
+                  <a:ext cx="2139821" cy="827315"/>
+                </a:xfrm>
+                <a:prstGeom prst="roundRect">
+                  <a:avLst/>
+                </a:prstGeom>
+              </p:spPr>
+              <p:style>
+                <a:lnRef idx="2">
+                  <a:schemeClr val="accent1">
+                    <a:shade val="15000"/>
+                  </a:schemeClr>
+                </a:lnRef>
+                <a:fillRef idx="1">
+                  <a:schemeClr val="accent1"/>
+                </a:fillRef>
+                <a:effectRef idx="0">
+                  <a:schemeClr val="accent1"/>
+                </a:effectRef>
+                <a:fontRef idx="minor">
+                  <a:schemeClr val="lt1"/>
+                </a:fontRef>
+              </p:style>
+              <p:txBody>
+                <a:bodyPr rtlCol="0" anchor="ctr"/>
+                <a:lstStyle/>
+                <a:p>
+                  <a:pPr algn="ctr"/>
+                  <a:r>
+                    <a:rPr lang="en-US" dirty="0"/>
+                    <a:t>TREAT SOME </a:t>
+                  </a:r>
+                  <a:br>
+                    <a:rPr lang="en-US" dirty="0"/>
+                  </a:br>
+                  <a:r>
+                    <a:rPr lang="en-US" dirty="0"/>
+                    <a:t>(model-guided)</a:t>
+                  </a:r>
+                  <a:endParaRPr lang="en-AU" dirty="0"/>
+                </a:p>
+              </p:txBody>
+            </p:sp>
+            <p:sp>
+              <p:nvSpPr>
+                <p:cNvPr id="2" name="Rectangle: Rounded Corners 1">
+                  <a:extLst>
+                    <a:ext uri="{FF2B5EF4-FFF2-40B4-BE49-F238E27FC236}">
+                      <a16:creationId xmlns:a16="http://schemas.microsoft.com/office/drawing/2014/main" id="{1099D08B-7D26-AE27-8797-9B91356EDFF5}"/>
+                    </a:ext>
+                  </a:extLst>
+                </p:cNvPr>
+                <p:cNvSpPr/>
+                <p:nvPr/>
+              </p:nvSpPr>
+              <p:spPr>
+                <a:xfrm>
+                  <a:off x="749558" y="4069940"/>
+                  <a:ext cx="2208245" cy="1302155"/>
+                </a:xfrm>
+                <a:prstGeom prst="roundRect">
+                  <a:avLst/>
+                </a:prstGeom>
+                <a:solidFill>
+                  <a:schemeClr val="accent2">
+                    <a:lumMod val="40000"/>
+                    <a:lumOff val="60000"/>
+                  </a:schemeClr>
+                </a:solidFill>
+              </p:spPr>
+              <p:style>
+                <a:lnRef idx="2">
+                  <a:schemeClr val="accent1">
+                    <a:shade val="15000"/>
+                  </a:schemeClr>
+                </a:lnRef>
+                <a:fillRef idx="1">
+                  <a:schemeClr val="accent1"/>
+                </a:fillRef>
+                <a:effectRef idx="0">
+                  <a:schemeClr val="accent1"/>
+                </a:effectRef>
+                <a:fontRef idx="minor">
+                  <a:schemeClr val="lt1"/>
+                </a:fontRef>
+              </p:style>
+              <p:txBody>
+                <a:bodyPr rtlCol="0" anchor="ctr"/>
+                <a:lstStyle/>
+                <a:p>
+                  <a:pPr marL="285750" indent="-285750">
+                    <a:buFontTx/>
+                    <a:buChar char="-"/>
+                  </a:pPr>
+                  <a:r>
+                    <a:rPr lang="en-US" sz="1400" dirty="0">
+                      <a:ln w="0"/>
+                      <a:solidFill>
+                        <a:schemeClr val="tx1"/>
+                      </a:solidFill>
+                      <a:effectLst>
+                        <a:outerShdw blurRad="38100" dist="19050" dir="2700000" algn="tl" rotWithShape="0">
+                          <a:schemeClr val="dk1">
+                            <a:alpha val="40000"/>
+                          </a:schemeClr>
+                        </a:outerShdw>
+                      </a:effectLst>
+                    </a:rPr>
+                    <a:t>Treatment $$$</a:t>
+                  </a:r>
+                </a:p>
+                <a:p>
+                  <a:pPr marL="285750" indent="-285750">
+                    <a:buFontTx/>
+                    <a:buChar char="-"/>
+                  </a:pPr>
+                  <a:r>
+                    <a:rPr lang="en-US" sz="1400" dirty="0">
+                      <a:ln w="0"/>
+                      <a:solidFill>
+                        <a:schemeClr val="tx1"/>
+                      </a:solidFill>
+                      <a:effectLst>
+                        <a:outerShdw blurRad="38100" dist="19050" dir="2700000" algn="tl" rotWithShape="0">
+                          <a:schemeClr val="dk1">
+                            <a:alpha val="40000"/>
+                          </a:schemeClr>
+                        </a:outerShdw>
+                      </a:effectLst>
+                    </a:rPr>
+                    <a:t>Treatment not very effective</a:t>
+                  </a:r>
+                </a:p>
+                <a:p>
+                  <a:pPr marL="285750" indent="-285750">
+                    <a:buFontTx/>
+                    <a:buChar char="-"/>
+                  </a:pPr>
+                  <a:r>
+                    <a:rPr lang="en-US" sz="1400" dirty="0">
+                      <a:ln w="0"/>
+                      <a:solidFill>
+                        <a:schemeClr val="tx1"/>
+                      </a:solidFill>
+                      <a:effectLst>
+                        <a:outerShdw blurRad="38100" dist="19050" dir="2700000" algn="tl" rotWithShape="0">
+                          <a:schemeClr val="dk1">
+                            <a:alpha val="40000"/>
+                          </a:schemeClr>
+                        </a:outerShdw>
+                      </a:effectLst>
+                    </a:rPr>
+                    <a:t>Outcome $</a:t>
+                  </a:r>
+                </a:p>
+                <a:p>
+                  <a:pPr marL="285750" indent="-285750">
+                    <a:buFontTx/>
+                    <a:buChar char="-"/>
+                  </a:pPr>
+                  <a:r>
+                    <a:rPr lang="en-US" sz="1400" dirty="0">
+                      <a:ln w="0"/>
+                      <a:solidFill>
+                        <a:schemeClr val="tx1"/>
+                      </a:solidFill>
+                      <a:effectLst>
+                        <a:outerShdw blurRad="38100" dist="19050" dir="2700000" algn="tl" rotWithShape="0">
+                          <a:schemeClr val="dk1">
+                            <a:alpha val="40000"/>
+                          </a:schemeClr>
+                        </a:outerShdw>
+                      </a:effectLst>
+                    </a:rPr>
+                    <a:t>Outcome is rare</a:t>
+                  </a:r>
+                  <a:endParaRPr lang="en-AU" sz="1400" dirty="0">
+                    <a:ln w="0"/>
+                    <a:solidFill>
+                      <a:schemeClr val="tx1"/>
+                    </a:solidFill>
+                    <a:effectLst>
+                      <a:outerShdw blurRad="38100" dist="19050" dir="2700000" algn="tl" rotWithShape="0">
+                        <a:schemeClr val="dk1">
+                          <a:alpha val="40000"/>
+                        </a:schemeClr>
+                      </a:outerShdw>
+                    </a:effectLst>
+                  </a:endParaRPr>
+                </a:p>
+              </p:txBody>
+            </p:sp>
+            <p:sp>
+              <p:nvSpPr>
+                <p:cNvPr id="3" name="Rectangle: Rounded Corners 2">
+                  <a:extLst>
+                    <a:ext uri="{FF2B5EF4-FFF2-40B4-BE49-F238E27FC236}">
+                      <a16:creationId xmlns:a16="http://schemas.microsoft.com/office/drawing/2014/main" id="{6027315E-E322-B2F8-43D3-022EC2CA42E4}"/>
+                    </a:ext>
+                  </a:extLst>
+                </p:cNvPr>
+                <p:cNvSpPr/>
+                <p:nvPr/>
+              </p:nvSpPr>
+              <p:spPr>
+                <a:xfrm>
+                  <a:off x="4674635" y="4069940"/>
+                  <a:ext cx="2208245" cy="1302153"/>
+                </a:xfrm>
+                <a:prstGeom prst="roundRect">
+                  <a:avLst/>
+                </a:prstGeom>
+                <a:solidFill>
+                  <a:schemeClr val="accent2">
+                    <a:lumMod val="40000"/>
+                    <a:lumOff val="60000"/>
+                  </a:schemeClr>
+                </a:solidFill>
+              </p:spPr>
+              <p:style>
+                <a:lnRef idx="2">
+                  <a:schemeClr val="accent1">
+                    <a:shade val="15000"/>
+                  </a:schemeClr>
+                </a:lnRef>
+                <a:fillRef idx="1">
+                  <a:schemeClr val="accent1"/>
+                </a:fillRef>
+                <a:effectRef idx="0">
+                  <a:schemeClr val="accent1"/>
+                </a:effectRef>
+                <a:fontRef idx="minor">
+                  <a:schemeClr val="lt1"/>
+                </a:fontRef>
+              </p:style>
+              <p:txBody>
+                <a:bodyPr rtlCol="0" anchor="ctr"/>
+                <a:lstStyle/>
+                <a:p>
+                  <a:pPr marL="285750" indent="-285750">
+                    <a:buFontTx/>
+                    <a:buChar char="-"/>
+                  </a:pPr>
+                  <a:r>
+                    <a:rPr lang="en-AU" sz="1400" dirty="0">
+                      <a:ln w="0"/>
+                      <a:solidFill>
+                        <a:schemeClr val="tx1"/>
+                      </a:solidFill>
+                      <a:effectLst>
+                        <a:outerShdw blurRad="38100" dist="19050" dir="2700000" algn="tl" rotWithShape="0">
+                          <a:schemeClr val="dk1">
+                            <a:alpha val="40000"/>
+                          </a:schemeClr>
+                        </a:outerShdw>
+                      </a:effectLst>
+                    </a:rPr>
+                    <a:t>Model performs well</a:t>
+                  </a:r>
+                </a:p>
+                <a:p>
+                  <a:pPr marL="285750" indent="-285750">
+                    <a:buFontTx/>
+                    <a:buChar char="-"/>
+                  </a:pPr>
+                  <a:r>
+                    <a:rPr lang="en-AU" sz="1400" dirty="0">
+                      <a:ln w="0"/>
+                      <a:solidFill>
+                        <a:schemeClr val="tx1"/>
+                      </a:solidFill>
+                      <a:effectLst>
+                        <a:outerShdw blurRad="38100" dist="19050" dir="2700000" algn="tl" rotWithShape="0">
+                          <a:schemeClr val="dk1">
+                            <a:alpha val="40000"/>
+                          </a:schemeClr>
+                        </a:outerShdw>
+                      </a:effectLst>
+                    </a:rPr>
+                    <a:t>Treatments $$+</a:t>
+                  </a:r>
+                </a:p>
+                <a:p>
+                  <a:pPr marL="285750" indent="-285750">
+                    <a:buFontTx/>
+                    <a:buChar char="-"/>
+                  </a:pPr>
+                  <a:r>
+                    <a:rPr lang="en-AU" sz="1400" dirty="0">
+                      <a:ln w="0"/>
+                      <a:solidFill>
+                        <a:schemeClr val="tx1"/>
+                      </a:solidFill>
+                      <a:effectLst>
+                        <a:outerShdw blurRad="38100" dist="19050" dir="2700000" algn="tl" rotWithShape="0">
+                          <a:schemeClr val="dk1">
+                            <a:alpha val="40000"/>
+                          </a:schemeClr>
+                        </a:outerShdw>
+                      </a:effectLst>
+                    </a:rPr>
+                    <a:t>Outcome $$+</a:t>
+                  </a:r>
+                </a:p>
+                <a:p>
+                  <a:pPr marL="285750" indent="-285750">
+                    <a:buFontTx/>
+                    <a:buChar char="-"/>
+                  </a:pPr>
+                  <a:r>
+                    <a:rPr lang="en-AU" sz="1400" dirty="0">
+                      <a:ln w="0"/>
+                      <a:solidFill>
+                        <a:schemeClr val="tx1"/>
+                      </a:solidFill>
+                      <a:effectLst>
+                        <a:outerShdw blurRad="38100" dist="19050" dir="2700000" algn="tl" rotWithShape="0">
+                          <a:schemeClr val="dk1">
+                            <a:alpha val="40000"/>
+                          </a:schemeClr>
+                        </a:outerShdw>
+                      </a:effectLst>
+                    </a:rPr>
+                    <a:t>Intervention being guided is effective</a:t>
+                  </a:r>
+                </a:p>
+              </p:txBody>
+            </p:sp>
+          </p:grpSp>
+          <p:sp>
+            <p:nvSpPr>
+              <p:cNvPr id="7" name="Rectangle: Rounded Corners 6">
+                <a:extLst>
+                  <a:ext uri="{FF2B5EF4-FFF2-40B4-BE49-F238E27FC236}">
+                    <a16:creationId xmlns:a16="http://schemas.microsoft.com/office/drawing/2014/main" id="{31D3C340-6863-259C-1639-AD7B55F2A539}"/>
+                  </a:ext>
+                </a:extLst>
+              </p:cNvPr>
+              <p:cNvSpPr/>
+              <p:nvPr/>
+            </p:nvSpPr>
+            <p:spPr>
+              <a:xfrm>
+                <a:off x="9085190" y="4069940"/>
+                <a:ext cx="2308483" cy="1302153"/>
+              </a:xfrm>
+              <a:prstGeom prst="roundRect">
+                <a:avLst/>
+              </a:prstGeom>
+              <a:solidFill>
+                <a:schemeClr val="accent2">
+                  <a:lumMod val="40000"/>
+                  <a:lumOff val="60000"/>
+                </a:schemeClr>
+              </a:solidFill>
+            </p:spPr>
+            <p:style>
+              <a:lnRef idx="2">
+                <a:schemeClr val="accent1">
+                  <a:shade val="15000"/>
+                </a:schemeClr>
+              </a:lnRef>
+              <a:fillRef idx="1">
+                <a:schemeClr val="accent1"/>
+              </a:fillRef>
+              <a:effectRef idx="0">
+                <a:schemeClr val="accent1"/>
+              </a:effectRef>
+              <a:fontRef idx="minor">
+                <a:schemeClr val="lt1"/>
+              </a:fontRef>
+            </p:style>
+            <p:txBody>
+              <a:bodyPr rtlCol="0" anchor="ctr"/>
+              <a:lstStyle/>
+              <a:p>
+                <a:pPr marL="285750" indent="-285750">
+                  <a:buFontTx/>
+                  <a:buChar char="-"/>
+                </a:pPr>
+                <a:r>
+                  <a:rPr lang="en-AU" sz="1400" dirty="0">
+                    <a:ln w="0"/>
+                    <a:solidFill>
+                      <a:schemeClr val="tx1"/>
+                    </a:solidFill>
+                    <a:effectLst>
+                      <a:outerShdw blurRad="38100" dist="19050" dir="2700000" algn="tl" rotWithShape="0">
+                        <a:schemeClr val="dk1">
+                          <a:alpha val="40000"/>
+                        </a:schemeClr>
+                      </a:outerShdw>
+                    </a:effectLst>
+                  </a:rPr>
+                  <a:t>Treatment $</a:t>
+                </a:r>
+              </a:p>
+              <a:p>
+                <a:pPr marL="285750" indent="-285750">
+                  <a:buFontTx/>
+                  <a:buChar char="-"/>
+                </a:pPr>
+                <a:r>
+                  <a:rPr lang="en-AU" sz="1400" dirty="0">
+                    <a:ln w="0"/>
+                    <a:solidFill>
+                      <a:schemeClr val="tx1"/>
+                    </a:solidFill>
+                    <a:effectLst>
+                      <a:outerShdw blurRad="38100" dist="19050" dir="2700000" algn="tl" rotWithShape="0">
+                        <a:schemeClr val="dk1">
+                          <a:alpha val="40000"/>
+                        </a:schemeClr>
+                      </a:outerShdw>
+                    </a:effectLst>
+                  </a:rPr>
+                  <a:t>Treatment is effective</a:t>
+                </a:r>
+              </a:p>
+              <a:p>
+                <a:pPr marL="285750" indent="-285750">
+                  <a:buFontTx/>
+                  <a:buChar char="-"/>
+                </a:pPr>
+                <a:r>
+                  <a:rPr lang="en-AU" sz="1400" dirty="0">
+                    <a:ln w="0"/>
+                    <a:solidFill>
+                      <a:schemeClr val="tx1"/>
+                    </a:solidFill>
+                    <a:effectLst>
+                      <a:outerShdw blurRad="38100" dist="19050" dir="2700000" algn="tl" rotWithShape="0">
+                        <a:schemeClr val="dk1">
+                          <a:alpha val="40000"/>
+                        </a:schemeClr>
+                      </a:outerShdw>
+                    </a:effectLst>
+                  </a:rPr>
+                  <a:t>Outcome $$$</a:t>
+                </a:r>
+              </a:p>
+              <a:p>
+                <a:pPr marL="285750" indent="-285750">
+                  <a:buFontTx/>
+                  <a:buChar char="-"/>
+                </a:pPr>
+                <a:r>
+                  <a:rPr lang="en-AU" sz="1400" dirty="0">
+                    <a:ln w="0"/>
+                    <a:solidFill>
+                      <a:schemeClr val="tx1"/>
+                    </a:solidFill>
+                    <a:effectLst>
+                      <a:outerShdw blurRad="38100" dist="19050" dir="2700000" algn="tl" rotWithShape="0">
+                        <a:schemeClr val="dk1">
+                          <a:alpha val="40000"/>
+                        </a:schemeClr>
+                      </a:outerShdw>
+                    </a:effectLst>
+                  </a:rPr>
+                  <a:t>Outcome is common</a:t>
+                </a:r>
+              </a:p>
+            </p:txBody>
+          </p:sp>
+        </p:grpSp>
+        <p:grpSp>
+          <p:nvGrpSpPr>
+            <p:cNvPr id="17" name="Group 16">
+              <a:extLst>
+                <a:ext uri="{FF2B5EF4-FFF2-40B4-BE49-F238E27FC236}">
+                  <a16:creationId xmlns:a16="http://schemas.microsoft.com/office/drawing/2014/main" id="{F3A1F7EB-C689-F9FF-F6FA-E8C135AF34C4}"/>
+                </a:ext>
+              </a:extLst>
+            </p:cNvPr>
+            <p:cNvGrpSpPr/>
+            <p:nvPr/>
+          </p:nvGrpSpPr>
+          <p:grpSpPr>
+            <a:xfrm>
+              <a:off x="1919714" y="3588802"/>
+              <a:ext cx="8347219" cy="1555808"/>
+              <a:chOff x="1919714" y="3588802"/>
+              <a:chExt cx="8347219" cy="1555808"/>
+            </a:xfrm>
+          </p:grpSpPr>
+          <p:cxnSp>
+            <p:nvCxnSpPr>
+              <p:cNvPr id="9" name="Straight Arrow Connector 8">
+                <a:extLst>
+                  <a:ext uri="{FF2B5EF4-FFF2-40B4-BE49-F238E27FC236}">
+                    <a16:creationId xmlns:a16="http://schemas.microsoft.com/office/drawing/2014/main" id="{3E15B6DE-1C7F-5CB5-54FB-5C540EA69839}"/>
+                  </a:ext>
+                </a:extLst>
+              </p:cNvPr>
+              <p:cNvCxnSpPr>
+                <a:cxnSpLocks/>
+              </p:cNvCxnSpPr>
+              <p:nvPr/>
+            </p:nvCxnSpPr>
+            <p:spPr>
+              <a:xfrm flipV="1">
+                <a:off x="1919714" y="3597676"/>
+                <a:ext cx="0" cy="1546934"/>
+              </a:xfrm>
+              <a:prstGeom prst="straightConnector1">
+                <a:avLst/>
+              </a:prstGeom>
+              <a:ln w="76200">
+                <a:tailEnd type="triangle"/>
+              </a:ln>
+            </p:spPr>
+            <p:style>
+              <a:lnRef idx="2">
+                <a:schemeClr val="accent4"/>
+              </a:lnRef>
+              <a:fillRef idx="0">
+                <a:schemeClr val="accent4"/>
+              </a:fillRef>
+              <a:effectRef idx="1">
+                <a:schemeClr val="accent4"/>
+              </a:effectRef>
+              <a:fontRef idx="minor">
+                <a:schemeClr val="tx1"/>
+              </a:fontRef>
+            </p:style>
+          </p:cxnSp>
+          <p:cxnSp>
+            <p:nvCxnSpPr>
+              <p:cNvPr id="10" name="Straight Arrow Connector 9">
+                <a:extLst>
+                  <a:ext uri="{FF2B5EF4-FFF2-40B4-BE49-F238E27FC236}">
+                    <a16:creationId xmlns:a16="http://schemas.microsoft.com/office/drawing/2014/main" id="{0424C615-C4C9-AE8E-B830-38C30428CF80}"/>
+                  </a:ext>
+                </a:extLst>
+              </p:cNvPr>
+              <p:cNvCxnSpPr>
+                <a:cxnSpLocks/>
+              </p:cNvCxnSpPr>
+              <p:nvPr/>
+            </p:nvCxnSpPr>
+            <p:spPr>
+              <a:xfrm flipV="1">
+                <a:off x="6096000" y="4208016"/>
+                <a:ext cx="0" cy="936594"/>
+              </a:xfrm>
+              <a:prstGeom prst="straightConnector1">
+                <a:avLst/>
+              </a:prstGeom>
+              <a:ln w="76200">
+                <a:tailEnd type="triangle"/>
+              </a:ln>
+            </p:spPr>
+            <p:style>
+              <a:lnRef idx="2">
+                <a:schemeClr val="accent4"/>
+              </a:lnRef>
+              <a:fillRef idx="0">
+                <a:schemeClr val="accent4"/>
+              </a:fillRef>
+              <a:effectRef idx="1">
+                <a:schemeClr val="accent4"/>
+              </a:effectRef>
+              <a:fontRef idx="minor">
+                <a:schemeClr val="tx1"/>
+              </a:fontRef>
+            </p:style>
+          </p:cxnSp>
+          <p:cxnSp>
+            <p:nvCxnSpPr>
+              <p:cNvPr id="14" name="Straight Arrow Connector 13">
+                <a:extLst>
+                  <a:ext uri="{FF2B5EF4-FFF2-40B4-BE49-F238E27FC236}">
+                    <a16:creationId xmlns:a16="http://schemas.microsoft.com/office/drawing/2014/main" id="{1972B623-02F1-9EB7-8797-67555B545CBA}"/>
+                  </a:ext>
+                </a:extLst>
+              </p:cNvPr>
+              <p:cNvCxnSpPr>
+                <a:cxnSpLocks/>
+              </p:cNvCxnSpPr>
+              <p:nvPr/>
+            </p:nvCxnSpPr>
+            <p:spPr>
+              <a:xfrm flipV="1">
+                <a:off x="10266933" y="3597676"/>
+                <a:ext cx="0" cy="1546934"/>
+              </a:xfrm>
+              <a:prstGeom prst="straightConnector1">
+                <a:avLst/>
+              </a:prstGeom>
+              <a:ln w="76200">
+                <a:tailEnd type="triangle"/>
+              </a:ln>
+            </p:spPr>
+            <p:style>
+              <a:lnRef idx="2">
+                <a:schemeClr val="accent4"/>
+              </a:lnRef>
+              <a:fillRef idx="0">
+                <a:schemeClr val="accent4"/>
+              </a:fillRef>
+              <a:effectRef idx="1">
+                <a:schemeClr val="accent4"/>
+              </a:effectRef>
+              <a:fontRef idx="minor">
+                <a:schemeClr val="tx1"/>
+              </a:fontRef>
+            </p:style>
+          </p:cxnSp>
+          <p:sp>
+            <p:nvSpPr>
+              <p:cNvPr id="16" name="Rectangle: Rounded Corners 15">
+                <a:extLst>
+                  <a:ext uri="{FF2B5EF4-FFF2-40B4-BE49-F238E27FC236}">
+                    <a16:creationId xmlns:a16="http://schemas.microsoft.com/office/drawing/2014/main" id="{B846E52D-25FA-12B8-24B0-2FEAC049490B}"/>
+                  </a:ext>
+                </a:extLst>
+              </p:cNvPr>
+              <p:cNvSpPr/>
+              <p:nvPr/>
+            </p:nvSpPr>
+            <p:spPr>
+              <a:xfrm>
+                <a:off x="2842333" y="3588802"/>
+                <a:ext cx="6507331" cy="506026"/>
+              </a:xfrm>
+              <a:prstGeom prst="roundRect">
+                <a:avLst/>
+              </a:prstGeom>
+            </p:spPr>
+            <p:style>
+              <a:lnRef idx="2">
+                <a:schemeClr val="accent1">
+                  <a:shade val="15000"/>
+                </a:schemeClr>
+              </a:lnRef>
+              <a:fillRef idx="1">
+                <a:schemeClr val="accent1"/>
+              </a:fillRef>
+              <a:effectRef idx="0">
+                <a:schemeClr val="accent1"/>
+              </a:effectRef>
+              <a:fontRef idx="minor">
+                <a:schemeClr val="lt1"/>
+              </a:fontRef>
+            </p:style>
+            <p:txBody>
+              <a:bodyPr rtlCol="0" anchor="ctr"/>
+              <a:lstStyle/>
+              <a:p>
+                <a:pPr algn="ctr"/>
+                <a:r>
+                  <a:rPr lang="en-US" dirty="0"/>
+                  <a:t>Requirement of model performance to be useful</a:t>
+                </a:r>
+                <a:endParaRPr lang="en-AU" dirty="0"/>
+              </a:p>
+            </p:txBody>
+          </p:sp>
+        </p:grpSp>
+      </p:grpSp>
+    </p:spTree>
+    <p:extLst>
+      <p:ext uri="{BB962C8B-B14F-4D97-AF65-F5344CB8AC3E}">
+        <p14:creationId xmlns:p14="http://schemas.microsoft.com/office/powerpoint/2010/main" val="518006209"/>
+      </p:ext>
+    </p:extLst>
+  </p:cSld>
+  <p:clrMapOvr>
+    <a:masterClrMapping/>
+  </p:clrMapOvr>
+</p:sld>
+</file>
+
+<file path=ppt/slides/slide7.xml><?xml version="1.0" encoding="utf-8"?>
+<p:sld xmlns:a="http://schemas.openxmlformats.org/drawingml/2006/main" xmlns:r="http://schemas.openxmlformats.org/officeDocument/2006/relationships" xmlns:p="http://schemas.openxmlformats.org/presentationml/2006/main">
+  <p:cSld>
+    <p:spTree>
+      <p:nvGrpSpPr>
+        <p:cNvPr id="1" name=""/>
+        <p:cNvGrpSpPr/>
+        <p:nvPr/>
+      </p:nvGrpSpPr>
+      <p:grpSpPr>
+        <a:xfrm>
+          <a:off x="0" y="0"/>
+          <a:ext cx="0" cy="0"/>
+          <a:chOff x="0" y="0"/>
+          <a:chExt cx="0" cy="0"/>
+        </a:xfrm>
+      </p:grpSpPr>
+    </p:spTree>
+    <p:extLst>
+      <p:ext uri="{BB962C8B-B14F-4D97-AF65-F5344CB8AC3E}">
+        <p14:creationId xmlns:p14="http://schemas.microsoft.com/office/powerpoint/2010/main" val="1929543286"/>
+      </p:ext>
+    </p:extLst>
+  </p:cSld>
+  <p:clrMapOvr>
+    <a:masterClrMapping/>
+  </p:clrMapOvr>
+</p:sld>
+</file>
+
 <file path=ppt/theme/theme1.xml><?xml version="1.0" encoding="utf-8"?>
 <a:theme xmlns:a="http://schemas.openxmlformats.org/drawingml/2006/main" name="Office Theme">
   <a:themeElements>

</xml_diff>